<commit_message>
Update Presentation for Individual.pptx
</commit_message>
<xml_diff>
--- a/Presentation for Individual.pptx
+++ b/Presentation for Individual.pptx
@@ -6196,6 +6196,18 @@
             </a:r>
           </a:p>
           <a:p>
+            <a:r>
+              <a:rPr lang="en-US" dirty="0"/>
+              <a:t>http://</a:t>
+            </a:r>
+            <a:r>
+              <a:rPr lang="en-US" dirty="0" err="1"/>
+              <a:t>www.insaneslotz.com</a:t>
+            </a:r>
+            <a:r>
+              <a:rPr lang="en-US"/>
+              <a:t>/</a:t>
+            </a:r>
             <a:endParaRPr lang="en-US" dirty="0"/>
           </a:p>
         </p:txBody>

</xml_diff>